<commit_message>
Fixed small typo in sal-into-r slides.
</commit_message>
<xml_diff>
--- a/talks/sql-into-r/slides.pptx
+++ b/talks/sql-into-r/slides.pptx
@@ -23,6 +23,8 @@
     <p:sldId id="271" r:id="rId17"/>
     <p:sldId id="272" r:id="rId18"/>
     <p:sldId id="273" r:id="rId19"/>
+    <p:sldId id="274" r:id="rId20"/>
+    <p:sldId id="275" r:id="rId21"/>
   </p:sldIdLst>
   <p:sldSz cx="9144000" cy="6858000" type="screen4x3"/>
   <p:notesSz cx="6858000" cy="9144000"/>
@@ -3902,9 +3904,12 @@
               </a:rPr>
               <a:t>``{r login-to-oracle}
 library("ROracle")
-cdm_config &lt;- read.csv('../cdm_config_A1.csv', stringsAsFactors=FALSE)
-c_connect &lt;-
-  dbConnect(Oracle(), cdm_config$account, cdm_config$password, cdm_config$access)
+cdm_config &lt;- read.csv('../cdm_config.csv', stringsAsFactors=FALSE)
+c_connect &lt;- dbConnect(
+  Oracle(),
+  cdm_config$account, 
+  cdm_config$password, 
+  cdm_config$access)
 ``</a:t>
             </a:r>
           </a:p>
@@ -4004,10 +4009,9 @@
                 <a:latin typeface="Courier"/>
               </a:rPr>
               <a:t>``{r simple-test}
-n &lt;- dbGetQuery(c_connect, 
+dbGetQuery(c_connect, 
   "SELECT COUNT(patient_num)
      FROM blueherondata.observation_fact")
-format(n, big.mark=",")
 ``</a:t>
             </a:r>
           </a:p>
@@ -4106,7 +4110,7 @@
               <a:rPr sz="1800">
                 <a:latin typeface="Courier"/>
               </a:rPr>
-              <a:t>``{sql direct-access, 
+              <a:t>``{sql test-direct-access, 
      connection=c_connect,
      output.var="total_count"}
 SELECT COUNT(patient_num) 
@@ -4158,71 +4162,31 @@
             </a:pPr>
             <a:r>
               <a:rPr/>
-              <a:t>Where</a:t>
-            </a:r>
-            <a:r>
-              <a:rPr/>
-              <a:t> </a:t>
-            </a:r>
-            <a:r>
-              <a:rPr/>
-              <a:t>you</a:t>
-            </a:r>
-            <a:r>
-              <a:rPr/>
-              <a:t> </a:t>
-            </a:r>
-            <a:r>
-              <a:rPr/>
-              <a:t>can</a:t>
-            </a:r>
-            <a:r>
-              <a:rPr/>
-              <a:t> </a:t>
-            </a:r>
-            <a:r>
-              <a:rPr/>
-              <a:t>find</a:t>
-            </a:r>
-            <a:r>
-              <a:rPr/>
-              <a:t> </a:t>
-            </a:r>
-            <a:r>
-              <a:rPr/>
-              <a:t>a</a:t>
-            </a:r>
-            <a:r>
-              <a:rPr/>
-              <a:t> </a:t>
-            </a:r>
-            <a:r>
-              <a:rPr/>
-              <a:t>copy</a:t>
-            </a:r>
-            <a:r>
-              <a:rPr/>
-              <a:t> </a:t>
-            </a:r>
-            <a:r>
-              <a:rPr/>
-              <a:t>of</a:t>
-            </a:r>
-            <a:r>
-              <a:rPr/>
-              <a:t> </a:t>
-            </a:r>
-            <a:r>
-              <a:rPr/>
-              <a:t>this</a:t>
-            </a:r>
-            <a:r>
-              <a:rPr/>
-              <a:t> </a:t>
-            </a:r>
-            <a:r>
-              <a:rPr/>
-              <a:t>talk.</a:t>
+              <a:t>When</a:t>
+            </a:r>
+            <a:r>
+              <a:rPr/>
+              <a:t> </a:t>
+            </a:r>
+            <a:r>
+              <a:rPr/>
+              <a:t>to</a:t>
+            </a:r>
+            <a:r>
+              <a:rPr/>
+              <a:t> </a:t>
+            </a:r>
+            <a:r>
+              <a:rPr/>
+              <a:t>use</a:t>
+            </a:r>
+            <a:r>
+              <a:rPr/>
+              <a:t> </a:t>
+            </a:r>
+            <a:r>
+              <a:rPr/>
+              <a:t>what</a:t>
             </a:r>
           </a:p>
         </p:txBody>
@@ -4242,44 +4206,204 @@
           <a:bodyPr/>
           <a:lstStyle/>
           <a:p>
+            <a:pPr lvl="1"/>
+            <a:r>
+              <a:rPr/>
+              <a:t>Databuilder and RSQLite</a:t>
+            </a:r>
+          </a:p>
+          <a:p>
+            <a:pPr lvl="2"/>
+            <a:r>
+              <a:rPr/>
+              <a:t>Well-defined hypothesis</a:t>
+            </a:r>
+          </a:p>
+          <a:p>
+            <a:pPr lvl="2"/>
+            <a:r>
+              <a:rPr/>
+              <a:t>Single static dataset</a:t>
+            </a:r>
+          </a:p>
+          <a:p>
+            <a:pPr lvl="2"/>
+            <a:r>
+              <a:rPr/>
+              <a:t>Small and moderate sized</a:t>
+            </a:r>
+          </a:p>
+          <a:p>
+            <a:pPr lvl="1"/>
+            <a:r>
+              <a:rPr/>
+              <a:t>Oracle and ROracle</a:t>
+            </a:r>
+          </a:p>
+          <a:p>
+            <a:pPr lvl="2"/>
+            <a:r>
+              <a:rPr/>
+              <a:t>Exploratory analyses</a:t>
+            </a:r>
+          </a:p>
+          <a:p>
+            <a:pPr lvl="2"/>
+            <a:r>
+              <a:rPr/>
+              <a:t>Multiple dynamic datasets</a:t>
+            </a:r>
+          </a:p>
+          <a:p>
+            <a:pPr lvl="2"/>
+            <a:r>
+              <a:rPr/>
+              <a:t>Large size</a:t>
+            </a:r>
+          </a:p>
+        </p:txBody>
+      </p:sp>
+    </p:spTree>
+  </p:cSld>
+</p:sld>
+</file>
+
+<file path=ppt/slides/slide19.xml><?xml version="1.0" encoding="utf-8"?>
+<p:sld xmlns:a="http://schemas.openxmlformats.org/drawingml/2006/main" xmlns:r="http://schemas.openxmlformats.org/officeDocument/2006/relationships" xmlns:p="http://schemas.openxmlformats.org/presentationml/2006/main">
+  <p:cSld>
+    <p:spTree>
+      <p:nvGrpSpPr>
+        <p:cNvPr id="1" name=""/>
+        <p:cNvGrpSpPr/>
+        <p:nvPr/>
+      </p:nvGrpSpPr>
+      <p:grpSpPr>
+        <a:xfrm>
+          <a:off x="0" y="0"/>
+          <a:ext cx="0" cy="0"/>
+          <a:chOff x="0" y="0"/>
+          <a:chExt cx="0" cy="0"/>
+        </a:xfrm>
+      </p:grpSpPr>
+      <p:sp>
+        <p:nvSpPr>
+          <p:cNvPr id="2" name="Title 1"/>
+          <p:cNvSpPr>
+            <a:spLocks noGrp="1"/>
+          </p:cNvSpPr>
+          <p:nvPr>
+            <p:ph type="title"/>
+          </p:nvPr>
+        </p:nvSpPr>
+        <p:spPr/>
+        <p:txBody>
+          <a:bodyPr/>
+          <a:lstStyle/>
+          <a:p>
             <a:pPr lvl="0" marL="0" indent="0">
               <a:buNone/>
             </a:pPr>
             <a:r>
               <a:rPr/>
-              <a:t>This presentation was developed using R Markdown. You can find all the important stuff at</a:t>
-            </a:r>
-          </a:p>
+              <a:t>Other</a:t>
+            </a:r>
+            <a:r>
+              <a:rPr/>
+              <a:t> </a:t>
+            </a:r>
+            <a:r>
+              <a:rPr/>
+              <a:t>consideratons</a:t>
+            </a:r>
+            <a:r>
+              <a:rPr/>
+              <a:t> </a:t>
+            </a:r>
+            <a:r>
+              <a:rPr/>
+              <a:t>for</a:t>
+            </a:r>
+            <a:r>
+              <a:rPr/>
+              <a:t> </a:t>
+            </a:r>
+            <a:r>
+              <a:rPr/>
+              <a:t>Oracle</a:t>
+            </a:r>
+            <a:r>
+              <a:rPr/>
+              <a:t> </a:t>
+            </a:r>
+            <a:r>
+              <a:rPr/>
+              <a:t>and</a:t>
+            </a:r>
+            <a:r>
+              <a:rPr/>
+              <a:t> </a:t>
+            </a:r>
+            <a:r>
+              <a:rPr/>
+              <a:t>ROracle</a:t>
+            </a:r>
+          </a:p>
+        </p:txBody>
+      </p:sp>
+      <p:sp>
+        <p:nvSpPr>
+          <p:cNvPr id="3" name="Content Placeholder 2"/>
+          <p:cNvSpPr>
+            <a:spLocks noGrp="1"/>
+          </p:cNvSpPr>
+          <p:nvPr>
+            <p:ph idx="1"/>
+          </p:nvPr>
+        </p:nvSpPr>
+        <p:spPr/>
+        <p:txBody>
+          <a:bodyPr/>
+          <a:lstStyle/>
           <a:p>
             <a:pPr lvl="1"/>
             <a:r>
-              <a:rPr>
-                <a:hlinkClick r:id="rId2"/>
-              </a:rPr>
-              <a:t>https://github.com/kumc-bmi/heron-i2b2-analytics</a:t>
-            </a:r>
-          </a:p>
-          <a:p>
-            <a:pPr lvl="0" marL="0" indent="0">
-              <a:buNone/>
-            </a:pPr>
-            <a:r>
-              <a:rPr/>
-              <a:t>In particular, look for</a:t>
+              <a:rPr/>
+              <a:t>Do as much as you can in SQL</a:t>
             </a:r>
           </a:p>
           <a:p>
             <a:pPr lvl="1"/>
             <a:r>
               <a:rPr/>
-              <a:t>talks/sql-into-r/slides.pptx</a:t>
+              <a:t>Baby steps</a:t>
             </a:r>
           </a:p>
           <a:p>
             <a:pPr lvl="1"/>
             <a:r>
               <a:rPr/>
-              <a:t>talks/sql-into-r/speaker-notes.pdf</a:t>
+              <a:t>Watch your timing</a:t>
+            </a:r>
+          </a:p>
+          <a:p>
+            <a:pPr lvl="2"/>
+            <a:r>
+              <a:rPr/>
+              <a:t>Sys.time()</a:t>
+            </a:r>
+          </a:p>
+          <a:p>
+            <a:pPr lvl="2"/>
+            <a:r>
+              <a:rPr/>
+              <a:t>tictoc library</a:t>
+            </a:r>
+          </a:p>
+          <a:p>
+            <a:pPr lvl="1"/>
+            <a:r>
+              <a:rPr/>
+              <a:t>Be prepared to approach differently</a:t>
             </a:r>
           </a:p>
         </p:txBody>
@@ -4409,6 +4533,167 @@
             <a:r>
               <a:rPr/>
               <a:t>SQL interface</a:t>
+            </a:r>
+          </a:p>
+        </p:txBody>
+      </p:sp>
+    </p:spTree>
+  </p:cSld>
+</p:sld>
+</file>
+
+<file path=ppt/slides/slide20.xml><?xml version="1.0" encoding="utf-8"?>
+<p:sld xmlns:a="http://schemas.openxmlformats.org/drawingml/2006/main" xmlns:r="http://schemas.openxmlformats.org/officeDocument/2006/relationships" xmlns:p="http://schemas.openxmlformats.org/presentationml/2006/main">
+  <p:cSld>
+    <p:spTree>
+      <p:nvGrpSpPr>
+        <p:cNvPr id="1" name=""/>
+        <p:cNvGrpSpPr/>
+        <p:nvPr/>
+      </p:nvGrpSpPr>
+      <p:grpSpPr>
+        <a:xfrm>
+          <a:off x="0" y="0"/>
+          <a:ext cx="0" cy="0"/>
+          <a:chOff x="0" y="0"/>
+          <a:chExt cx="0" cy="0"/>
+        </a:xfrm>
+      </p:grpSpPr>
+      <p:sp>
+        <p:nvSpPr>
+          <p:cNvPr id="2" name="Title 1"/>
+          <p:cNvSpPr>
+            <a:spLocks noGrp="1"/>
+          </p:cNvSpPr>
+          <p:nvPr>
+            <p:ph type="title"/>
+          </p:nvPr>
+        </p:nvSpPr>
+        <p:spPr/>
+        <p:txBody>
+          <a:bodyPr/>
+          <a:lstStyle/>
+          <a:p>
+            <a:pPr lvl="0" marL="0" indent="0">
+              <a:buNone/>
+            </a:pPr>
+            <a:r>
+              <a:rPr/>
+              <a:t>Where</a:t>
+            </a:r>
+            <a:r>
+              <a:rPr/>
+              <a:t> </a:t>
+            </a:r>
+            <a:r>
+              <a:rPr/>
+              <a:t>you</a:t>
+            </a:r>
+            <a:r>
+              <a:rPr/>
+              <a:t> </a:t>
+            </a:r>
+            <a:r>
+              <a:rPr/>
+              <a:t>can</a:t>
+            </a:r>
+            <a:r>
+              <a:rPr/>
+              <a:t> </a:t>
+            </a:r>
+            <a:r>
+              <a:rPr/>
+              <a:t>find</a:t>
+            </a:r>
+            <a:r>
+              <a:rPr/>
+              <a:t> </a:t>
+            </a:r>
+            <a:r>
+              <a:rPr/>
+              <a:t>a</a:t>
+            </a:r>
+            <a:r>
+              <a:rPr/>
+              <a:t> </a:t>
+            </a:r>
+            <a:r>
+              <a:rPr/>
+              <a:t>copy</a:t>
+            </a:r>
+            <a:r>
+              <a:rPr/>
+              <a:t> </a:t>
+            </a:r>
+            <a:r>
+              <a:rPr/>
+              <a:t>of</a:t>
+            </a:r>
+            <a:r>
+              <a:rPr/>
+              <a:t> </a:t>
+            </a:r>
+            <a:r>
+              <a:rPr/>
+              <a:t>this</a:t>
+            </a:r>
+            <a:r>
+              <a:rPr/>
+              <a:t> </a:t>
+            </a:r>
+            <a:r>
+              <a:rPr/>
+              <a:t>talk.</a:t>
+            </a:r>
+          </a:p>
+        </p:txBody>
+      </p:sp>
+      <p:sp>
+        <p:nvSpPr>
+          <p:cNvPr id="3" name="Content Placeholder 2"/>
+          <p:cNvSpPr>
+            <a:spLocks noGrp="1"/>
+          </p:cNvSpPr>
+          <p:nvPr>
+            <p:ph idx="1"/>
+          </p:nvPr>
+        </p:nvSpPr>
+        <p:spPr/>
+        <p:txBody>
+          <a:bodyPr/>
+          <a:lstStyle/>
+          <a:p>
+            <a:pPr lvl="0" marL="0" indent="0">
+              <a:buNone/>
+            </a:pPr>
+            <a:r>
+              <a:rPr/>
+              <a:t>This presentation was developed using R Markdown. You can find all the important stuff at</a:t>
+            </a:r>
+          </a:p>
+          <a:p>
+            <a:pPr lvl="1"/>
+            <a:r>
+              <a:rPr>
+                <a:hlinkClick r:id="rId2"/>
+              </a:rPr>
+              <a:t>https://github.com/kumc-bmi/heron-i2b2-analytics</a:t>
+            </a:r>
+          </a:p>
+          <a:p>
+            <a:pPr lvl="0" marL="0" indent="0">
+              <a:buNone/>
+            </a:pPr>
+            <a:r>
+              <a:rPr/>
+              <a:t>In particular, look for</a:t>
+            </a:r>
+          </a:p>
+          <a:p>
+            <a:pPr lvl="1"/>
+            <a:r>
+              <a:rPr/>
+              <a:t>talks/sql-into-r/slides.pptx</a:t>
             </a:r>
           </a:p>
         </p:txBody>

</xml_diff>